<commit_message>
structuring and styling country explorer page
</commit_message>
<xml_diff>
--- a/Presentation1.pptx
+++ b/Presentation1.pptx
@@ -12,6 +12,13 @@
     <p:sldId id="260" r:id="rId6"/>
     <p:sldId id="262" r:id="rId7"/>
     <p:sldId id="261" r:id="rId8"/>
+    <p:sldId id="264" r:id="rId9"/>
+    <p:sldId id="265" r:id="rId10"/>
+    <p:sldId id="266" r:id="rId11"/>
+    <p:sldId id="267" r:id="rId12"/>
+    <p:sldId id="268" r:id="rId13"/>
+    <p:sldId id="269" r:id="rId14"/>
+    <p:sldId id="270" r:id="rId15"/>
   </p:sldIdLst>
   <p:sldSz cx="9144000" cy="6858000" type="screen4x3"/>
   <p:notesSz cx="6858000" cy="9144000"/>
@@ -294,7 +301,7 @@
           <a:p>
             <a:fld id="{C862626A-4BFC-4253-9180-0C5C9967767B}" type="datetimeFigureOut">
               <a:rPr lang="en-US" smtClean="0"/>
-              <a:t>9/26/2016</a:t>
+              <a:t>10/22/2016</a:t>
             </a:fld>
             <a:endParaRPr lang="en-US"/>
           </a:p>
@@ -464,7 +471,7 @@
           <a:p>
             <a:fld id="{C862626A-4BFC-4253-9180-0C5C9967767B}" type="datetimeFigureOut">
               <a:rPr lang="en-US" smtClean="0"/>
-              <a:t>9/26/2016</a:t>
+              <a:t>10/22/2016</a:t>
             </a:fld>
             <a:endParaRPr lang="en-US"/>
           </a:p>
@@ -644,7 +651,7 @@
           <a:p>
             <a:fld id="{C862626A-4BFC-4253-9180-0C5C9967767B}" type="datetimeFigureOut">
               <a:rPr lang="en-US" smtClean="0"/>
-              <a:t>9/26/2016</a:t>
+              <a:t>10/22/2016</a:t>
             </a:fld>
             <a:endParaRPr lang="en-US"/>
           </a:p>
@@ -814,7 +821,7 @@
           <a:p>
             <a:fld id="{C862626A-4BFC-4253-9180-0C5C9967767B}" type="datetimeFigureOut">
               <a:rPr lang="en-US" smtClean="0"/>
-              <a:t>9/26/2016</a:t>
+              <a:t>10/22/2016</a:t>
             </a:fld>
             <a:endParaRPr lang="en-US"/>
           </a:p>
@@ -1060,7 +1067,7 @@
           <a:p>
             <a:fld id="{C862626A-4BFC-4253-9180-0C5C9967767B}" type="datetimeFigureOut">
               <a:rPr lang="en-US" smtClean="0"/>
-              <a:t>9/26/2016</a:t>
+              <a:t>10/22/2016</a:t>
             </a:fld>
             <a:endParaRPr lang="en-US"/>
           </a:p>
@@ -1348,7 +1355,7 @@
           <a:p>
             <a:fld id="{C862626A-4BFC-4253-9180-0C5C9967767B}" type="datetimeFigureOut">
               <a:rPr lang="en-US" smtClean="0"/>
-              <a:t>9/26/2016</a:t>
+              <a:t>10/22/2016</a:t>
             </a:fld>
             <a:endParaRPr lang="en-US"/>
           </a:p>
@@ -1770,7 +1777,7 @@
           <a:p>
             <a:fld id="{C862626A-4BFC-4253-9180-0C5C9967767B}" type="datetimeFigureOut">
               <a:rPr lang="en-US" smtClean="0"/>
-              <a:t>9/26/2016</a:t>
+              <a:t>10/22/2016</a:t>
             </a:fld>
             <a:endParaRPr lang="en-US"/>
           </a:p>
@@ -1888,7 +1895,7 @@
           <a:p>
             <a:fld id="{C862626A-4BFC-4253-9180-0C5C9967767B}" type="datetimeFigureOut">
               <a:rPr lang="en-US" smtClean="0"/>
-              <a:t>9/26/2016</a:t>
+              <a:t>10/22/2016</a:t>
             </a:fld>
             <a:endParaRPr lang="en-US"/>
           </a:p>
@@ -1983,7 +1990,7 @@
           <a:p>
             <a:fld id="{C862626A-4BFC-4253-9180-0C5C9967767B}" type="datetimeFigureOut">
               <a:rPr lang="en-US" smtClean="0"/>
-              <a:t>9/26/2016</a:t>
+              <a:t>10/22/2016</a:t>
             </a:fld>
             <a:endParaRPr lang="en-US"/>
           </a:p>
@@ -2260,7 +2267,7 @@
           <a:p>
             <a:fld id="{C862626A-4BFC-4253-9180-0C5C9967767B}" type="datetimeFigureOut">
               <a:rPr lang="en-US" smtClean="0"/>
-              <a:t>9/26/2016</a:t>
+              <a:t>10/22/2016</a:t>
             </a:fld>
             <a:endParaRPr lang="en-US"/>
           </a:p>
@@ -2513,7 +2520,7 @@
           <a:p>
             <a:fld id="{C862626A-4BFC-4253-9180-0C5C9967767B}" type="datetimeFigureOut">
               <a:rPr lang="en-US" smtClean="0"/>
-              <a:t>9/26/2016</a:t>
+              <a:t>10/22/2016</a:t>
             </a:fld>
             <a:endParaRPr lang="en-US"/>
           </a:p>
@@ -2726,7 +2733,7 @@
           <a:p>
             <a:fld id="{C862626A-4BFC-4253-9180-0C5C9967767B}" type="datetimeFigureOut">
               <a:rPr lang="en-US" smtClean="0"/>
-              <a:t>9/26/2016</a:t>
+              <a:t>10/22/2016</a:t>
             </a:fld>
             <a:endParaRPr lang="en-US"/>
           </a:p>
@@ -3206,6 +3213,623 @@
 </p:sld>
 </file>
 
+<file path=ppt/slides/slide10.xml><?xml version="1.0" encoding="utf-8"?>
+<p:sld xmlns:a="http://schemas.openxmlformats.org/drawingml/2006/main" xmlns:r="http://schemas.openxmlformats.org/officeDocument/2006/relationships" xmlns:p="http://schemas.openxmlformats.org/presentationml/2006/main">
+  <p:cSld>
+    <p:spTree>
+      <p:nvGrpSpPr>
+        <p:cNvPr id="1" name=""/>
+        <p:cNvGrpSpPr/>
+        <p:nvPr/>
+      </p:nvGrpSpPr>
+      <p:grpSpPr>
+        <a:xfrm>
+          <a:off x="0" y="0"/>
+          <a:ext cx="0" cy="0"/>
+          <a:chOff x="0" y="0"/>
+          <a:chExt cx="0" cy="0"/>
+        </a:xfrm>
+      </p:grpSpPr>
+      <p:sp>
+        <p:nvSpPr>
+          <p:cNvPr id="2" name="Title 1"/>
+          <p:cNvSpPr>
+            <a:spLocks noGrp="1"/>
+          </p:cNvSpPr>
+          <p:nvPr>
+            <p:ph type="title"/>
+          </p:nvPr>
+        </p:nvSpPr>
+        <p:spPr/>
+        <p:txBody>
+          <a:bodyPr/>
+          <a:lstStyle/>
+          <a:p>
+            <a:endParaRPr lang="en-US"/>
+          </a:p>
+        </p:txBody>
+      </p:sp>
+      <p:sp>
+        <p:nvSpPr>
+          <p:cNvPr id="3" name="Content Placeholder 2"/>
+          <p:cNvSpPr>
+            <a:spLocks noGrp="1"/>
+          </p:cNvSpPr>
+          <p:nvPr>
+            <p:ph idx="1"/>
+          </p:nvPr>
+        </p:nvSpPr>
+        <p:spPr/>
+        <p:txBody>
+          <a:bodyPr/>
+          <a:lstStyle/>
+          <a:p>
+            <a:endParaRPr lang="en-US"/>
+          </a:p>
+        </p:txBody>
+      </p:sp>
+      <p:pic>
+        <p:nvPicPr>
+          <p:cNvPr id="3074" name="Picture 2"/>
+          <p:cNvPicPr>
+            <a:picLocks noChangeAspect="1" noChangeArrowheads="1"/>
+          </p:cNvPicPr>
+          <p:nvPr/>
+        </p:nvPicPr>
+        <p:blipFill>
+          <a:blip r:embed="rId2">
+            <a:extLst>
+              <a:ext uri="{28A0092B-C50C-407E-A947-70E740481C1C}">
+                <a14:useLocalDpi xmlns:a14="http://schemas.microsoft.com/office/drawing/2010/main" val="0"/>
+              </a:ext>
+            </a:extLst>
+          </a:blip>
+          <a:srcRect/>
+          <a:stretch>
+            <a:fillRect/>
+          </a:stretch>
+        </p:blipFill>
+        <p:spPr bwMode="auto">
+          <a:xfrm>
+            <a:off x="0" y="0"/>
+            <a:ext cx="13011150" cy="7315200"/>
+          </a:xfrm>
+          <a:prstGeom prst="rect">
+            <a:avLst/>
+          </a:prstGeom>
+          <a:noFill/>
+          <a:ln>
+            <a:noFill/>
+          </a:ln>
+          <a:extLst>
+            <a:ext uri="{909E8E84-426E-40DD-AFC4-6F175D3DCCD1}">
+              <a14:hiddenFill xmlns:a14="http://schemas.microsoft.com/office/drawing/2010/main">
+                <a:solidFill>
+                  <a:schemeClr val="accent1"/>
+                </a:solidFill>
+              </a14:hiddenFill>
+            </a:ext>
+            <a:ext uri="{91240B29-F687-4F45-9708-019B960494DF}">
+              <a14:hiddenLine xmlns:a14="http://schemas.microsoft.com/office/drawing/2010/main" w="9525">
+                <a:solidFill>
+                  <a:schemeClr val="tx1"/>
+                </a:solidFill>
+                <a:miter lim="800000"/>
+                <a:headEnd/>
+                <a:tailEnd/>
+              </a14:hiddenLine>
+            </a:ext>
+          </a:extLst>
+        </p:spPr>
+      </p:pic>
+    </p:spTree>
+    <p:extLst>
+      <p:ext uri="{BB962C8B-B14F-4D97-AF65-F5344CB8AC3E}">
+        <p14:creationId xmlns:p14="http://schemas.microsoft.com/office/powerpoint/2010/main" val="1472487979"/>
+      </p:ext>
+    </p:extLst>
+  </p:cSld>
+  <p:clrMapOvr>
+    <a:masterClrMapping/>
+  </p:clrMapOvr>
+  <p:timing>
+    <p:tnLst>
+      <p:par>
+        <p:cTn id="1" dur="indefinite" restart="never" nodeType="tmRoot"/>
+      </p:par>
+    </p:tnLst>
+  </p:timing>
+</p:sld>
+</file>
+
+<file path=ppt/slides/slide11.xml><?xml version="1.0" encoding="utf-8"?>
+<p:sld xmlns:a="http://schemas.openxmlformats.org/drawingml/2006/main" xmlns:r="http://schemas.openxmlformats.org/officeDocument/2006/relationships" xmlns:p="http://schemas.openxmlformats.org/presentationml/2006/main">
+  <p:cSld>
+    <p:spTree>
+      <p:nvGrpSpPr>
+        <p:cNvPr id="1" name=""/>
+        <p:cNvGrpSpPr/>
+        <p:nvPr/>
+      </p:nvGrpSpPr>
+      <p:grpSpPr>
+        <a:xfrm>
+          <a:off x="0" y="0"/>
+          <a:ext cx="0" cy="0"/>
+          <a:chOff x="0" y="0"/>
+          <a:chExt cx="0" cy="0"/>
+        </a:xfrm>
+      </p:grpSpPr>
+      <p:sp>
+        <p:nvSpPr>
+          <p:cNvPr id="2" name="Title 1"/>
+          <p:cNvSpPr>
+            <a:spLocks noGrp="1"/>
+          </p:cNvSpPr>
+          <p:nvPr>
+            <p:ph type="title"/>
+          </p:nvPr>
+        </p:nvSpPr>
+        <p:spPr/>
+        <p:txBody>
+          <a:bodyPr/>
+          <a:lstStyle/>
+          <a:p>
+            <a:endParaRPr lang="en-US"/>
+          </a:p>
+        </p:txBody>
+      </p:sp>
+      <p:sp>
+        <p:nvSpPr>
+          <p:cNvPr id="3" name="Content Placeholder 2"/>
+          <p:cNvSpPr>
+            <a:spLocks noGrp="1"/>
+          </p:cNvSpPr>
+          <p:nvPr>
+            <p:ph idx="1"/>
+          </p:nvPr>
+        </p:nvSpPr>
+        <p:spPr/>
+        <p:txBody>
+          <a:bodyPr/>
+          <a:lstStyle/>
+          <a:p>
+            <a:endParaRPr lang="en-US"/>
+          </a:p>
+        </p:txBody>
+      </p:sp>
+      <p:pic>
+        <p:nvPicPr>
+          <p:cNvPr id="4098" name="Picture 2"/>
+          <p:cNvPicPr>
+            <a:picLocks noChangeAspect="1" noChangeArrowheads="1"/>
+          </p:cNvPicPr>
+          <p:nvPr/>
+        </p:nvPicPr>
+        <p:blipFill>
+          <a:blip r:embed="rId2">
+            <a:extLst>
+              <a:ext uri="{28A0092B-C50C-407E-A947-70E740481C1C}">
+                <a14:useLocalDpi xmlns:a14="http://schemas.microsoft.com/office/drawing/2010/main" val="0"/>
+              </a:ext>
+            </a:extLst>
+          </a:blip>
+          <a:srcRect/>
+          <a:stretch>
+            <a:fillRect/>
+          </a:stretch>
+        </p:blipFill>
+        <p:spPr bwMode="auto">
+          <a:xfrm>
+            <a:off x="0" y="0"/>
+            <a:ext cx="13011150" cy="7315200"/>
+          </a:xfrm>
+          <a:prstGeom prst="rect">
+            <a:avLst/>
+          </a:prstGeom>
+          <a:noFill/>
+          <a:ln>
+            <a:noFill/>
+          </a:ln>
+          <a:extLst>
+            <a:ext uri="{909E8E84-426E-40DD-AFC4-6F175D3DCCD1}">
+              <a14:hiddenFill xmlns:a14="http://schemas.microsoft.com/office/drawing/2010/main">
+                <a:solidFill>
+                  <a:schemeClr val="accent1"/>
+                </a:solidFill>
+              </a14:hiddenFill>
+            </a:ext>
+            <a:ext uri="{91240B29-F687-4F45-9708-019B960494DF}">
+              <a14:hiddenLine xmlns:a14="http://schemas.microsoft.com/office/drawing/2010/main" w="9525">
+                <a:solidFill>
+                  <a:schemeClr val="tx1"/>
+                </a:solidFill>
+                <a:miter lim="800000"/>
+                <a:headEnd/>
+                <a:tailEnd/>
+              </a14:hiddenLine>
+            </a:ext>
+          </a:extLst>
+        </p:spPr>
+      </p:pic>
+    </p:spTree>
+    <p:extLst>
+      <p:ext uri="{BB962C8B-B14F-4D97-AF65-F5344CB8AC3E}">
+        <p14:creationId xmlns:p14="http://schemas.microsoft.com/office/powerpoint/2010/main" val="485160055"/>
+      </p:ext>
+    </p:extLst>
+  </p:cSld>
+  <p:clrMapOvr>
+    <a:masterClrMapping/>
+  </p:clrMapOvr>
+</p:sld>
+</file>
+
+<file path=ppt/slides/slide12.xml><?xml version="1.0" encoding="utf-8"?>
+<p:sld xmlns:a="http://schemas.openxmlformats.org/drawingml/2006/main" xmlns:r="http://schemas.openxmlformats.org/officeDocument/2006/relationships" xmlns:p="http://schemas.openxmlformats.org/presentationml/2006/main">
+  <p:cSld>
+    <p:spTree>
+      <p:nvGrpSpPr>
+        <p:cNvPr id="1" name=""/>
+        <p:cNvGrpSpPr/>
+        <p:nvPr/>
+      </p:nvGrpSpPr>
+      <p:grpSpPr>
+        <a:xfrm>
+          <a:off x="0" y="0"/>
+          <a:ext cx="0" cy="0"/>
+          <a:chOff x="0" y="0"/>
+          <a:chExt cx="0" cy="0"/>
+        </a:xfrm>
+      </p:grpSpPr>
+      <p:sp>
+        <p:nvSpPr>
+          <p:cNvPr id="2" name="Title 1"/>
+          <p:cNvSpPr>
+            <a:spLocks noGrp="1"/>
+          </p:cNvSpPr>
+          <p:nvPr>
+            <p:ph type="title"/>
+          </p:nvPr>
+        </p:nvSpPr>
+        <p:spPr/>
+        <p:txBody>
+          <a:bodyPr/>
+          <a:lstStyle/>
+          <a:p>
+            <a:endParaRPr lang="en-US"/>
+          </a:p>
+        </p:txBody>
+      </p:sp>
+      <p:sp>
+        <p:nvSpPr>
+          <p:cNvPr id="3" name="Content Placeholder 2"/>
+          <p:cNvSpPr>
+            <a:spLocks noGrp="1"/>
+          </p:cNvSpPr>
+          <p:nvPr>
+            <p:ph idx="1"/>
+          </p:nvPr>
+        </p:nvSpPr>
+        <p:spPr/>
+        <p:txBody>
+          <a:bodyPr/>
+          <a:lstStyle/>
+          <a:p>
+            <a:endParaRPr lang="en-US"/>
+          </a:p>
+        </p:txBody>
+      </p:sp>
+      <p:pic>
+        <p:nvPicPr>
+          <p:cNvPr id="5122" name="Picture 2"/>
+          <p:cNvPicPr>
+            <a:picLocks noChangeAspect="1" noChangeArrowheads="1"/>
+          </p:cNvPicPr>
+          <p:nvPr/>
+        </p:nvPicPr>
+        <p:blipFill>
+          <a:blip r:embed="rId2">
+            <a:extLst>
+              <a:ext uri="{28A0092B-C50C-407E-A947-70E740481C1C}">
+                <a14:useLocalDpi xmlns:a14="http://schemas.microsoft.com/office/drawing/2010/main" val="0"/>
+              </a:ext>
+            </a:extLst>
+          </a:blip>
+          <a:srcRect/>
+          <a:stretch>
+            <a:fillRect/>
+          </a:stretch>
+        </p:blipFill>
+        <p:spPr bwMode="auto">
+          <a:xfrm>
+            <a:off x="0" y="0"/>
+            <a:ext cx="13011150" cy="7315200"/>
+          </a:xfrm>
+          <a:prstGeom prst="rect">
+            <a:avLst/>
+          </a:prstGeom>
+          <a:noFill/>
+          <a:ln>
+            <a:noFill/>
+          </a:ln>
+          <a:extLst>
+            <a:ext uri="{909E8E84-426E-40DD-AFC4-6F175D3DCCD1}">
+              <a14:hiddenFill xmlns:a14="http://schemas.microsoft.com/office/drawing/2010/main">
+                <a:solidFill>
+                  <a:schemeClr val="accent1"/>
+                </a:solidFill>
+              </a14:hiddenFill>
+            </a:ext>
+            <a:ext uri="{91240B29-F687-4F45-9708-019B960494DF}">
+              <a14:hiddenLine xmlns:a14="http://schemas.microsoft.com/office/drawing/2010/main" w="9525">
+                <a:solidFill>
+                  <a:schemeClr val="tx1"/>
+                </a:solidFill>
+                <a:miter lim="800000"/>
+                <a:headEnd/>
+                <a:tailEnd/>
+              </a14:hiddenLine>
+            </a:ext>
+          </a:extLst>
+        </p:spPr>
+      </p:pic>
+    </p:spTree>
+    <p:extLst>
+      <p:ext uri="{BB962C8B-B14F-4D97-AF65-F5344CB8AC3E}">
+        <p14:creationId xmlns:p14="http://schemas.microsoft.com/office/powerpoint/2010/main" val="3084427592"/>
+      </p:ext>
+    </p:extLst>
+  </p:cSld>
+  <p:clrMapOvr>
+    <a:masterClrMapping/>
+  </p:clrMapOvr>
+</p:sld>
+</file>
+
+<file path=ppt/slides/slide13.xml><?xml version="1.0" encoding="utf-8"?>
+<p:sld xmlns:a="http://schemas.openxmlformats.org/drawingml/2006/main" xmlns:r="http://schemas.openxmlformats.org/officeDocument/2006/relationships" xmlns:p="http://schemas.openxmlformats.org/presentationml/2006/main">
+  <p:cSld>
+    <p:spTree>
+      <p:nvGrpSpPr>
+        <p:cNvPr id="1" name=""/>
+        <p:cNvGrpSpPr/>
+        <p:nvPr/>
+      </p:nvGrpSpPr>
+      <p:grpSpPr>
+        <a:xfrm>
+          <a:off x="0" y="0"/>
+          <a:ext cx="0" cy="0"/>
+          <a:chOff x="0" y="0"/>
+          <a:chExt cx="0" cy="0"/>
+        </a:xfrm>
+      </p:grpSpPr>
+      <p:sp>
+        <p:nvSpPr>
+          <p:cNvPr id="2" name="Title 1"/>
+          <p:cNvSpPr>
+            <a:spLocks noGrp="1"/>
+          </p:cNvSpPr>
+          <p:nvPr>
+            <p:ph type="title"/>
+          </p:nvPr>
+        </p:nvSpPr>
+        <p:spPr/>
+        <p:txBody>
+          <a:bodyPr/>
+          <a:lstStyle/>
+          <a:p>
+            <a:endParaRPr lang="en-US"/>
+          </a:p>
+        </p:txBody>
+      </p:sp>
+      <p:sp>
+        <p:nvSpPr>
+          <p:cNvPr id="3" name="Content Placeholder 2"/>
+          <p:cNvSpPr>
+            <a:spLocks noGrp="1"/>
+          </p:cNvSpPr>
+          <p:nvPr>
+            <p:ph idx="1"/>
+          </p:nvPr>
+        </p:nvSpPr>
+        <p:spPr/>
+        <p:txBody>
+          <a:bodyPr/>
+          <a:lstStyle/>
+          <a:p>
+            <a:endParaRPr lang="en-US"/>
+          </a:p>
+        </p:txBody>
+      </p:sp>
+      <p:pic>
+        <p:nvPicPr>
+          <p:cNvPr id="6146" name="Picture 2"/>
+          <p:cNvPicPr>
+            <a:picLocks noChangeAspect="1" noChangeArrowheads="1"/>
+          </p:cNvPicPr>
+          <p:nvPr/>
+        </p:nvPicPr>
+        <p:blipFill>
+          <a:blip r:embed="rId2">
+            <a:extLst>
+              <a:ext uri="{28A0092B-C50C-407E-A947-70E740481C1C}">
+                <a14:useLocalDpi xmlns:a14="http://schemas.microsoft.com/office/drawing/2010/main" val="0"/>
+              </a:ext>
+            </a:extLst>
+          </a:blip>
+          <a:srcRect/>
+          <a:stretch>
+            <a:fillRect/>
+          </a:stretch>
+        </p:blipFill>
+        <p:spPr bwMode="auto">
+          <a:xfrm>
+            <a:off x="0" y="0"/>
+            <a:ext cx="13011150" cy="7315200"/>
+          </a:xfrm>
+          <a:prstGeom prst="rect">
+            <a:avLst/>
+          </a:prstGeom>
+          <a:noFill/>
+          <a:ln>
+            <a:noFill/>
+          </a:ln>
+          <a:extLst>
+            <a:ext uri="{909E8E84-426E-40DD-AFC4-6F175D3DCCD1}">
+              <a14:hiddenFill xmlns:a14="http://schemas.microsoft.com/office/drawing/2010/main">
+                <a:solidFill>
+                  <a:schemeClr val="accent1"/>
+                </a:solidFill>
+              </a14:hiddenFill>
+            </a:ext>
+            <a:ext uri="{91240B29-F687-4F45-9708-019B960494DF}">
+              <a14:hiddenLine xmlns:a14="http://schemas.microsoft.com/office/drawing/2010/main" w="9525">
+                <a:solidFill>
+                  <a:schemeClr val="tx1"/>
+                </a:solidFill>
+                <a:miter lim="800000"/>
+                <a:headEnd/>
+                <a:tailEnd/>
+              </a14:hiddenLine>
+            </a:ext>
+          </a:extLst>
+        </p:spPr>
+      </p:pic>
+    </p:spTree>
+    <p:extLst>
+      <p:ext uri="{BB962C8B-B14F-4D97-AF65-F5344CB8AC3E}">
+        <p14:creationId xmlns:p14="http://schemas.microsoft.com/office/powerpoint/2010/main" val="3637110503"/>
+      </p:ext>
+    </p:extLst>
+  </p:cSld>
+  <p:clrMapOvr>
+    <a:masterClrMapping/>
+  </p:clrMapOvr>
+</p:sld>
+</file>
+
+<file path=ppt/slides/slide14.xml><?xml version="1.0" encoding="utf-8"?>
+<p:sld xmlns:a="http://schemas.openxmlformats.org/drawingml/2006/main" xmlns:r="http://schemas.openxmlformats.org/officeDocument/2006/relationships" xmlns:p="http://schemas.openxmlformats.org/presentationml/2006/main">
+  <p:cSld>
+    <p:spTree>
+      <p:nvGrpSpPr>
+        <p:cNvPr id="1" name=""/>
+        <p:cNvGrpSpPr/>
+        <p:nvPr/>
+      </p:nvGrpSpPr>
+      <p:grpSpPr>
+        <a:xfrm>
+          <a:off x="0" y="0"/>
+          <a:ext cx="0" cy="0"/>
+          <a:chOff x="0" y="0"/>
+          <a:chExt cx="0" cy="0"/>
+        </a:xfrm>
+      </p:grpSpPr>
+      <p:sp>
+        <p:nvSpPr>
+          <p:cNvPr id="2" name="Title 1"/>
+          <p:cNvSpPr>
+            <a:spLocks noGrp="1"/>
+          </p:cNvSpPr>
+          <p:nvPr>
+            <p:ph type="title"/>
+          </p:nvPr>
+        </p:nvSpPr>
+        <p:spPr/>
+        <p:txBody>
+          <a:bodyPr/>
+          <a:lstStyle/>
+          <a:p>
+            <a:endParaRPr lang="en-US"/>
+          </a:p>
+        </p:txBody>
+      </p:sp>
+      <p:sp>
+        <p:nvSpPr>
+          <p:cNvPr id="3" name="Content Placeholder 2"/>
+          <p:cNvSpPr>
+            <a:spLocks noGrp="1"/>
+          </p:cNvSpPr>
+          <p:nvPr>
+            <p:ph idx="1"/>
+          </p:nvPr>
+        </p:nvSpPr>
+        <p:spPr/>
+        <p:txBody>
+          <a:bodyPr/>
+          <a:lstStyle/>
+          <a:p>
+            <a:endParaRPr lang="en-US"/>
+          </a:p>
+        </p:txBody>
+      </p:sp>
+      <p:pic>
+        <p:nvPicPr>
+          <p:cNvPr id="8194" name="Picture 2"/>
+          <p:cNvPicPr>
+            <a:picLocks noChangeAspect="1" noChangeArrowheads="1"/>
+          </p:cNvPicPr>
+          <p:nvPr/>
+        </p:nvPicPr>
+        <p:blipFill>
+          <a:blip r:embed="rId2">
+            <a:extLst>
+              <a:ext uri="{28A0092B-C50C-407E-A947-70E740481C1C}">
+                <a14:useLocalDpi xmlns:a14="http://schemas.microsoft.com/office/drawing/2010/main" val="0"/>
+              </a:ext>
+            </a:extLst>
+          </a:blip>
+          <a:srcRect/>
+          <a:stretch>
+            <a:fillRect/>
+          </a:stretch>
+        </p:blipFill>
+        <p:spPr bwMode="auto">
+          <a:xfrm>
+            <a:off x="0" y="0"/>
+            <a:ext cx="13011150" cy="7315200"/>
+          </a:xfrm>
+          <a:prstGeom prst="rect">
+            <a:avLst/>
+          </a:prstGeom>
+          <a:noFill/>
+          <a:ln>
+            <a:noFill/>
+          </a:ln>
+          <a:extLst>
+            <a:ext uri="{909E8E84-426E-40DD-AFC4-6F175D3DCCD1}">
+              <a14:hiddenFill xmlns:a14="http://schemas.microsoft.com/office/drawing/2010/main">
+                <a:solidFill>
+                  <a:schemeClr val="accent1"/>
+                </a:solidFill>
+              </a14:hiddenFill>
+            </a:ext>
+            <a:ext uri="{91240B29-F687-4F45-9708-019B960494DF}">
+              <a14:hiddenLine xmlns:a14="http://schemas.microsoft.com/office/drawing/2010/main" w="9525">
+                <a:solidFill>
+                  <a:schemeClr val="tx1"/>
+                </a:solidFill>
+                <a:miter lim="800000"/>
+                <a:headEnd/>
+                <a:tailEnd/>
+              </a14:hiddenLine>
+            </a:ext>
+          </a:extLst>
+        </p:spPr>
+      </p:pic>
+    </p:spTree>
+    <p:extLst>
+      <p:ext uri="{BB962C8B-B14F-4D97-AF65-F5344CB8AC3E}">
+        <p14:creationId xmlns:p14="http://schemas.microsoft.com/office/powerpoint/2010/main" val="3050231202"/>
+      </p:ext>
+    </p:extLst>
+  </p:cSld>
+  <p:clrMapOvr>
+    <a:masterClrMapping/>
+  </p:clrMapOvr>
+</p:sld>
+</file>
+
 <file path=ppt/slides/slide2.xml><?xml version="1.0" encoding="utf-8"?>
 <p:sld xmlns:a="http://schemas.openxmlformats.org/drawingml/2006/main" xmlns:r="http://schemas.openxmlformats.org/officeDocument/2006/relationships" xmlns:p="http://schemas.openxmlformats.org/presentationml/2006/main">
   <p:cSld>
@@ -3881,6 +4505,264 @@
   <p:clrMapOvr>
     <a:masterClrMapping/>
   </p:clrMapOvr>
+</p:sld>
+</file>
+
+<file path=ppt/slides/slide8.xml><?xml version="1.0" encoding="utf-8"?>
+<p:sld xmlns:a="http://schemas.openxmlformats.org/drawingml/2006/main" xmlns:r="http://schemas.openxmlformats.org/officeDocument/2006/relationships" xmlns:p="http://schemas.openxmlformats.org/presentationml/2006/main">
+  <p:cSld>
+    <p:spTree>
+      <p:nvGrpSpPr>
+        <p:cNvPr id="1" name=""/>
+        <p:cNvGrpSpPr/>
+        <p:nvPr/>
+      </p:nvGrpSpPr>
+      <p:grpSpPr>
+        <a:xfrm>
+          <a:off x="0" y="0"/>
+          <a:ext cx="0" cy="0"/>
+          <a:chOff x="0" y="0"/>
+          <a:chExt cx="0" cy="0"/>
+        </a:xfrm>
+      </p:grpSpPr>
+      <p:sp>
+        <p:nvSpPr>
+          <p:cNvPr id="2" name="Title 1"/>
+          <p:cNvSpPr>
+            <a:spLocks noGrp="1"/>
+          </p:cNvSpPr>
+          <p:nvPr>
+            <p:ph type="ctrTitle"/>
+          </p:nvPr>
+        </p:nvSpPr>
+        <p:spPr/>
+        <p:txBody>
+          <a:bodyPr/>
+          <a:lstStyle/>
+          <a:p>
+            <a:endParaRPr lang="en-US"/>
+          </a:p>
+        </p:txBody>
+      </p:sp>
+      <p:sp>
+        <p:nvSpPr>
+          <p:cNvPr id="3" name="Subtitle 2"/>
+          <p:cNvSpPr>
+            <a:spLocks noGrp="1"/>
+          </p:cNvSpPr>
+          <p:nvPr>
+            <p:ph type="subTitle" idx="1"/>
+          </p:nvPr>
+        </p:nvSpPr>
+        <p:spPr/>
+        <p:txBody>
+          <a:bodyPr/>
+          <a:lstStyle/>
+          <a:p>
+            <a:endParaRPr lang="en-US"/>
+          </a:p>
+        </p:txBody>
+      </p:sp>
+      <p:pic>
+        <p:nvPicPr>
+          <p:cNvPr id="1026" name="Picture 2"/>
+          <p:cNvPicPr>
+            <a:picLocks noChangeAspect="1" noChangeArrowheads="1"/>
+          </p:cNvPicPr>
+          <p:nvPr/>
+        </p:nvPicPr>
+        <p:blipFill>
+          <a:blip r:embed="rId2">
+            <a:extLst>
+              <a:ext uri="{28A0092B-C50C-407E-A947-70E740481C1C}">
+                <a14:useLocalDpi xmlns:a14="http://schemas.microsoft.com/office/drawing/2010/main" val="0"/>
+              </a:ext>
+            </a:extLst>
+          </a:blip>
+          <a:srcRect/>
+          <a:stretch>
+            <a:fillRect/>
+          </a:stretch>
+        </p:blipFill>
+        <p:spPr bwMode="auto">
+          <a:xfrm>
+            <a:off x="0" y="0"/>
+            <a:ext cx="13011150" cy="7315200"/>
+          </a:xfrm>
+          <a:prstGeom prst="rect">
+            <a:avLst/>
+          </a:prstGeom>
+          <a:noFill/>
+          <a:ln>
+            <a:noFill/>
+          </a:ln>
+          <a:extLst>
+            <a:ext uri="{909E8E84-426E-40DD-AFC4-6F175D3DCCD1}">
+              <a14:hiddenFill xmlns:a14="http://schemas.microsoft.com/office/drawing/2010/main">
+                <a:solidFill>
+                  <a:schemeClr val="accent1"/>
+                </a:solidFill>
+              </a14:hiddenFill>
+            </a:ext>
+            <a:ext uri="{91240B29-F687-4F45-9708-019B960494DF}">
+              <a14:hiddenLine xmlns:a14="http://schemas.microsoft.com/office/drawing/2010/main" w="9525">
+                <a:solidFill>
+                  <a:schemeClr val="tx1"/>
+                </a:solidFill>
+                <a:miter lim="800000"/>
+                <a:headEnd/>
+                <a:tailEnd/>
+              </a14:hiddenLine>
+            </a:ext>
+          </a:extLst>
+        </p:spPr>
+      </p:pic>
+    </p:spTree>
+    <p:extLst>
+      <p:ext uri="{BB962C8B-B14F-4D97-AF65-F5344CB8AC3E}">
+        <p14:creationId xmlns:p14="http://schemas.microsoft.com/office/powerpoint/2010/main" val="995114490"/>
+      </p:ext>
+    </p:extLst>
+  </p:cSld>
+  <p:clrMapOvr>
+    <a:masterClrMapping/>
+  </p:clrMapOvr>
+  <p:timing>
+    <p:tnLst>
+      <p:par>
+        <p:cTn id="1" dur="indefinite" restart="never" nodeType="tmRoot"/>
+      </p:par>
+    </p:tnLst>
+  </p:timing>
+</p:sld>
+</file>
+
+<file path=ppt/slides/slide9.xml><?xml version="1.0" encoding="utf-8"?>
+<p:sld xmlns:a="http://schemas.openxmlformats.org/drawingml/2006/main" xmlns:r="http://schemas.openxmlformats.org/officeDocument/2006/relationships" xmlns:p="http://schemas.openxmlformats.org/presentationml/2006/main">
+  <p:cSld>
+    <p:spTree>
+      <p:nvGrpSpPr>
+        <p:cNvPr id="1" name=""/>
+        <p:cNvGrpSpPr/>
+        <p:nvPr/>
+      </p:nvGrpSpPr>
+      <p:grpSpPr>
+        <a:xfrm>
+          <a:off x="0" y="0"/>
+          <a:ext cx="0" cy="0"/>
+          <a:chOff x="0" y="0"/>
+          <a:chExt cx="0" cy="0"/>
+        </a:xfrm>
+      </p:grpSpPr>
+      <p:sp>
+        <p:nvSpPr>
+          <p:cNvPr id="2" name="Title 1"/>
+          <p:cNvSpPr>
+            <a:spLocks noGrp="1"/>
+          </p:cNvSpPr>
+          <p:nvPr>
+            <p:ph type="title"/>
+          </p:nvPr>
+        </p:nvSpPr>
+        <p:spPr/>
+        <p:txBody>
+          <a:bodyPr/>
+          <a:lstStyle/>
+          <a:p>
+            <a:endParaRPr lang="en-US"/>
+          </a:p>
+        </p:txBody>
+      </p:sp>
+      <p:sp>
+        <p:nvSpPr>
+          <p:cNvPr id="3" name="Content Placeholder 2"/>
+          <p:cNvSpPr>
+            <a:spLocks noGrp="1"/>
+          </p:cNvSpPr>
+          <p:nvPr>
+            <p:ph idx="1"/>
+          </p:nvPr>
+        </p:nvSpPr>
+        <p:spPr/>
+        <p:txBody>
+          <a:bodyPr/>
+          <a:lstStyle/>
+          <a:p>
+            <a:endParaRPr lang="en-US"/>
+          </a:p>
+        </p:txBody>
+      </p:sp>
+      <p:pic>
+        <p:nvPicPr>
+          <p:cNvPr id="2050" name="Picture 2"/>
+          <p:cNvPicPr>
+            <a:picLocks noChangeAspect="1" noChangeArrowheads="1"/>
+          </p:cNvPicPr>
+          <p:nvPr/>
+        </p:nvPicPr>
+        <p:blipFill>
+          <a:blip r:embed="rId2">
+            <a:extLst>
+              <a:ext uri="{28A0092B-C50C-407E-A947-70E740481C1C}">
+                <a14:useLocalDpi xmlns:a14="http://schemas.microsoft.com/office/drawing/2010/main" val="0"/>
+              </a:ext>
+            </a:extLst>
+          </a:blip>
+          <a:srcRect/>
+          <a:stretch>
+            <a:fillRect/>
+          </a:stretch>
+        </p:blipFill>
+        <p:spPr bwMode="auto">
+          <a:xfrm>
+            <a:off x="0" y="-76200"/>
+            <a:ext cx="13011150" cy="7315200"/>
+          </a:xfrm>
+          <a:prstGeom prst="rect">
+            <a:avLst/>
+          </a:prstGeom>
+          <a:noFill/>
+          <a:ln>
+            <a:noFill/>
+          </a:ln>
+          <a:extLst>
+            <a:ext uri="{909E8E84-426E-40DD-AFC4-6F175D3DCCD1}">
+              <a14:hiddenFill xmlns:a14="http://schemas.microsoft.com/office/drawing/2010/main">
+                <a:solidFill>
+                  <a:schemeClr val="accent1"/>
+                </a:solidFill>
+              </a14:hiddenFill>
+            </a:ext>
+            <a:ext uri="{91240B29-F687-4F45-9708-019B960494DF}">
+              <a14:hiddenLine xmlns:a14="http://schemas.microsoft.com/office/drawing/2010/main" w="9525">
+                <a:solidFill>
+                  <a:schemeClr val="tx1"/>
+                </a:solidFill>
+                <a:miter lim="800000"/>
+                <a:headEnd/>
+                <a:tailEnd/>
+              </a14:hiddenLine>
+            </a:ext>
+          </a:extLst>
+        </p:spPr>
+      </p:pic>
+    </p:spTree>
+    <p:extLst>
+      <p:ext uri="{BB962C8B-B14F-4D97-AF65-F5344CB8AC3E}">
+        <p14:creationId xmlns:p14="http://schemas.microsoft.com/office/powerpoint/2010/main" val="1287514482"/>
+      </p:ext>
+    </p:extLst>
+  </p:cSld>
+  <p:clrMapOvr>
+    <a:masterClrMapping/>
+  </p:clrMapOvr>
+  <p:timing>
+    <p:tnLst>
+      <p:par>
+        <p:cTn id="1" dur="indefinite" restart="never" nodeType="tmRoot"/>
+      </p:par>
+    </p:tnLst>
+  </p:timing>
 </p:sld>
 </file>
 

</xml_diff>